<commit_message>
update ppt for report v3
update ppt for report v3
</commit_message>
<xml_diff>
--- a/src/ref/final_project_brief.pptx
+++ b/src/ref/final_project_brief.pptx
@@ -8,11 +8,12 @@
   </p:sldMasterIdLst>
   <p:sldIdLst>
     <p:sldId id="256" r:id="rId4"/>
-    <p:sldId id="257" r:id="rId5"/>
-    <p:sldId id="258" r:id="rId6"/>
-    <p:sldId id="259" r:id="rId7"/>
-    <p:sldId id="260" r:id="rId8"/>
-    <p:sldId id="261" r:id="rId9"/>
+    <p:sldId id="262" r:id="rId5"/>
+    <p:sldId id="257" r:id="rId6"/>
+    <p:sldId id="258" r:id="rId7"/>
+    <p:sldId id="259" r:id="rId8"/>
+    <p:sldId id="260" r:id="rId9"/>
+    <p:sldId id="261" r:id="rId10"/>
   </p:sldIdLst>
   <p:sldSz cx="9144000" cy="5143500" type="screen16x9"/>
   <p:notesSz cx="6858000" cy="9144000"/>
@@ -6273,7 +6274,7 @@
         </p:nvSpPr>
         <p:spPr>
           <a:xfrm>
-            <a:off x="3779912" y="1203598"/>
+            <a:off x="3563888" y="1059582"/>
             <a:ext cx="5292080" cy="1080121"/>
           </a:xfrm>
         </p:spPr>
@@ -6286,6 +6287,14 @@
                 <a:ea typeface="맑은 고딕" pitchFamily="50" charset="-127"/>
               </a:rPr>
               <a:t>ERB</a:t>
+            </a:r>
+          </a:p>
+          <a:p>
+            <a:r>
+              <a:rPr lang="en-US" altLang="ko-KR" sz="3600" dirty="0">
+                <a:ea typeface="맑은 고딕" pitchFamily="50" charset="-127"/>
+              </a:rPr>
+              <a:t>Front-end Development</a:t>
             </a:r>
           </a:p>
           <a:p>
@@ -6311,7 +6320,7 @@
         </p:nvSpPr>
         <p:spPr>
           <a:xfrm>
-            <a:off x="3851920" y="2499742"/>
+            <a:off x="3836967" y="2571750"/>
             <a:ext cx="5292080" cy="416808"/>
           </a:xfrm>
         </p:spPr>
@@ -6346,7 +6355,7 @@
         </p:nvSpPr>
         <p:spPr>
           <a:xfrm>
-            <a:off x="3836967" y="3075806"/>
+            <a:off x="3836967" y="3147814"/>
             <a:ext cx="3528540" cy="1200329"/>
           </a:xfrm>
           <a:prstGeom prst="rect">
@@ -6386,23 +6395,7 @@
                   <a:schemeClr val="bg1"/>
                 </a:solidFill>
               </a:rPr>
-              <a:t>Wong Wing Sum</a:t>
-            </a:r>
-            <a:r>
-              <a:rPr lang="en-US">
-                <a:solidFill>
-                  <a:schemeClr val="bg1"/>
-                </a:solidFill>
-              </a:rPr>
-              <a:t>, Wilson(</a:t>
-            </a:r>
-            <a:r>
-              <a:rPr lang="en-US" dirty="0">
-                <a:solidFill>
-                  <a:schemeClr val="bg1"/>
-                </a:solidFill>
-              </a:rPr>
-              <a:t>17)</a:t>
+              <a:t>Wong Wing Sum, Wilson(17)</a:t>
             </a:r>
           </a:p>
           <a:p>
@@ -6428,6 +6421,111 @@
 </file>
 
 <file path=ppt/slides/slide2.xml><?xml version="1.0" encoding="utf-8"?>
+<p:sld xmlns:a="http://schemas.openxmlformats.org/drawingml/2006/main" xmlns:r="http://schemas.openxmlformats.org/officeDocument/2006/relationships" xmlns:p="http://schemas.openxmlformats.org/presentationml/2006/main">
+  <p:cSld>
+    <p:spTree>
+      <p:nvGrpSpPr>
+        <p:cNvPr id="1" name=""/>
+        <p:cNvGrpSpPr/>
+        <p:nvPr/>
+      </p:nvGrpSpPr>
+      <p:grpSpPr>
+        <a:xfrm>
+          <a:off x="0" y="0"/>
+          <a:ext cx="0" cy="0"/>
+          <a:chOff x="0" y="0"/>
+          <a:chExt cx="0" cy="0"/>
+        </a:xfrm>
+      </p:grpSpPr>
+      <p:sp>
+        <p:nvSpPr>
+          <p:cNvPr id="4" name="TextBox 3">
+            <a:extLst>
+              <a:ext uri="{FF2B5EF4-FFF2-40B4-BE49-F238E27FC236}">
+                <a16:creationId xmlns:a16="http://schemas.microsoft.com/office/drawing/2014/main" id="{5878B42A-26B3-40D5-BC10-C3640CE3CE63}"/>
+              </a:ext>
+            </a:extLst>
+          </p:cNvPr>
+          <p:cNvSpPr txBox="1"/>
+          <p:nvPr/>
+        </p:nvSpPr>
+        <p:spPr>
+          <a:xfrm>
+            <a:off x="3491880" y="123478"/>
+            <a:ext cx="3096344" cy="369332"/>
+          </a:xfrm>
+          <a:prstGeom prst="rect">
+            <a:avLst/>
+          </a:prstGeom>
+          <a:noFill/>
+        </p:spPr>
+        <p:txBody>
+          <a:bodyPr wrap="square" rtlCol="0">
+            <a:spAutoFit/>
+          </a:bodyPr>
+          <a:lstStyle/>
+          <a:p>
+            <a:r>
+              <a:rPr lang="en-US" dirty="0">
+                <a:solidFill>
+                  <a:schemeClr val="bg1"/>
+                </a:solidFill>
+              </a:rPr>
+              <a:t>Webpage Structure</a:t>
+            </a:r>
+          </a:p>
+        </p:txBody>
+      </p:sp>
+      <p:pic>
+        <p:nvPicPr>
+          <p:cNvPr id="5" name="Picture 4">
+            <a:extLst>
+              <a:ext uri="{FF2B5EF4-FFF2-40B4-BE49-F238E27FC236}">
+                <a16:creationId xmlns:a16="http://schemas.microsoft.com/office/drawing/2014/main" id="{D9D3D4AF-FF46-45AD-BBAB-6438BC69B5FE}"/>
+              </a:ext>
+            </a:extLst>
+          </p:cNvPr>
+          <p:cNvPicPr>
+            <a:picLocks noChangeAspect="1"/>
+          </p:cNvPicPr>
+          <p:nvPr/>
+        </p:nvPicPr>
+        <p:blipFill>
+          <a:blip r:embed="rId2" cstate="print">
+            <a:extLst>
+              <a:ext uri="{28A0092B-C50C-407E-A947-70E740481C1C}">
+                <a14:useLocalDpi xmlns:a14="http://schemas.microsoft.com/office/drawing/2010/main" val="0"/>
+              </a:ext>
+            </a:extLst>
+          </a:blip>
+          <a:stretch>
+            <a:fillRect/>
+          </a:stretch>
+        </p:blipFill>
+        <p:spPr>
+          <a:xfrm>
+            <a:off x="467544" y="627534"/>
+            <a:ext cx="8313948" cy="4104456"/>
+          </a:xfrm>
+          <a:prstGeom prst="rect">
+            <a:avLst/>
+          </a:prstGeom>
+        </p:spPr>
+      </p:pic>
+    </p:spTree>
+    <p:extLst>
+      <p:ext uri="{BB962C8B-B14F-4D97-AF65-F5344CB8AC3E}">
+        <p14:creationId xmlns:p14="http://schemas.microsoft.com/office/powerpoint/2010/main" val="2558720928"/>
+      </p:ext>
+    </p:extLst>
+  </p:cSld>
+  <p:clrMapOvr>
+    <a:masterClrMapping/>
+  </p:clrMapOvr>
+</p:sld>
+</file>
+
+<file path=ppt/slides/slide3.xml><?xml version="1.0" encoding="utf-8"?>
 <p:sld xmlns:a="http://schemas.openxmlformats.org/drawingml/2006/main" xmlns:r="http://schemas.openxmlformats.org/officeDocument/2006/relationships" xmlns:p="http://schemas.openxmlformats.org/presentationml/2006/main">
   <p:cSld>
     <p:spTree>
@@ -6532,7 +6630,7 @@
 </p:sld>
 </file>
 
-<file path=ppt/slides/slide3.xml><?xml version="1.0" encoding="utf-8"?>
+<file path=ppt/slides/slide4.xml><?xml version="1.0" encoding="utf-8"?>
 <p:sld xmlns:a="http://schemas.openxmlformats.org/drawingml/2006/main" xmlns:r="http://schemas.openxmlformats.org/officeDocument/2006/relationships" xmlns:p="http://schemas.openxmlformats.org/presentationml/2006/main">
   <p:cSld>
     <p:spTree>
@@ -6637,7 +6735,7 @@
 </p:sld>
 </file>
 
-<file path=ppt/slides/slide4.xml><?xml version="1.0" encoding="utf-8"?>
+<file path=ppt/slides/slide5.xml><?xml version="1.0" encoding="utf-8"?>
 <p:sld xmlns:a="http://schemas.openxmlformats.org/drawingml/2006/main" xmlns:r="http://schemas.openxmlformats.org/officeDocument/2006/relationships" xmlns:p="http://schemas.openxmlformats.org/presentationml/2006/main">
   <p:cSld>
     <p:spTree>
@@ -6742,7 +6840,7 @@
 </p:sld>
 </file>
 
-<file path=ppt/slides/slide5.xml><?xml version="1.0" encoding="utf-8"?>
+<file path=ppt/slides/slide6.xml><?xml version="1.0" encoding="utf-8"?>
 <p:sld xmlns:a="http://schemas.openxmlformats.org/drawingml/2006/main" xmlns:r="http://schemas.openxmlformats.org/officeDocument/2006/relationships" xmlns:p="http://schemas.openxmlformats.org/presentationml/2006/main">
   <p:cSld>
     <p:spTree>
@@ -6821,7 +6919,7 @@
 </p:sld>
 </file>
 
-<file path=ppt/slides/slide6.xml><?xml version="1.0" encoding="utf-8"?>
+<file path=ppt/slides/slide7.xml><?xml version="1.0" encoding="utf-8"?>
 <p:sld xmlns:a="http://schemas.openxmlformats.org/drawingml/2006/main" xmlns:r="http://schemas.openxmlformats.org/officeDocument/2006/relationships" xmlns:p="http://schemas.openxmlformats.org/presentationml/2006/main">
   <p:cSld>
     <p:spTree>

</xml_diff>